<commit_message>
revision 1.1 with input from yizhou
</commit_message>
<xml_diff>
--- a/slides/evaluation/evaluation-interim-09122023-tcqf-csqf-glbf.pptx
+++ b/slides/evaluation/evaluation-interim-09122023-tcqf-csqf-glbf.pptx
@@ -3408,8 +3408,8 @@
         </p:nvSpPr>
         <p:spPr bwMode="auto">
           <a:xfrm flipH="0" flipV="0">
-            <a:off x="1522078" y="4730445"/>
-            <a:ext cx="9143280" cy="1817309"/>
+            <a:off x="485444" y="4038904"/>
+            <a:ext cx="11416951" cy="2508849"/>
           </a:xfrm>
           <a:prstGeom prst="rect">
             <a:avLst/>
@@ -3449,10 +3449,19 @@
                 </a:solidFill>
                 <a:latin typeface="Calibri"/>
               </a:rPr>
-              <a:t>Toerless Eckert, Futurewei USA </a:t>
+              <a:t>To</a:t>
             </a:r>
             <a:r>
-              <a:rPr lang="en-US" sz="2400" b="0" strike="noStrike" spc="0">
+              <a:rPr lang="en-US" sz="2000" b="0" strike="noStrike" spc="0">
+                <a:solidFill>
+                  <a:srgbClr val="000000"/>
+                </a:solidFill>
+                <a:latin typeface="Calibri"/>
+              </a:rPr>
+              <a:t>erless Eckert, Futurewei USA </a:t>
+            </a:r>
+            <a:r>
+              <a:rPr lang="en-US" sz="2000" b="0" strike="noStrike" spc="0">
                 <a:solidFill>
                   <a:srgbClr val="000000"/>
                 </a:solidFill>
@@ -3461,7 +3470,7 @@
               <a:t>(</a:t>
             </a:r>
             <a:r>
-              <a:rPr lang="en-US" sz="2400" b="0" u="sng" strike="noStrike" spc="0">
+              <a:rPr lang="en-US" sz="2000" b="0" u="sng" strike="noStrike" spc="0">
                 <a:solidFill>
                   <a:srgbClr val="0563C1"/>
                 </a:solidFill>
@@ -3471,11 +3480,62 @@
               <a:t>tte@cs.fau.de)</a:t>
             </a:r>
             <a:r>
-              <a:rPr/>
+              <a:rPr sz="2000"/>
               <a:t> (slide editor)</a:t>
             </a:r>
-            <a:endParaRPr sz="2400" b="0" strike="noStrike" spc="0">
-              <a:latin typeface="Arial"/>
+            <a:endParaRPr sz="2000"/>
+          </a:p>
+          <a:p>
+            <a:pPr algn="ctr">
+              <a:lnSpc>
+                <a:spcPct val="90000"/>
+              </a:lnSpc>
+              <a:spcBef>
+                <a:spcPts val="998"/>
+              </a:spcBef>
+              <a:defRPr/>
+            </a:pPr>
+            <a:r>
+              <a:rPr lang="en-US" sz="2000" b="0" i="0" u="none" strike="noStrike" cap="none" spc="0">
+                <a:solidFill>
+                  <a:srgbClr val="000000"/>
+                </a:solidFill>
+                <a:latin typeface="Calibri"/>
+                <a:ea typeface="Calibri"/>
+                <a:cs typeface="Calibri"/>
+              </a:rPr>
+              <a:t>Yizhou Li</a:t>
+            </a:r>
+            <a:r>
+              <a:rPr lang="en-US" sz="2000" b="0" i="0" u="none" strike="noStrike" cap="none" spc="0">
+                <a:solidFill>
+                  <a:srgbClr val="000000"/>
+                </a:solidFill>
+                <a:latin typeface="Calibri"/>
+                <a:ea typeface="Calibri"/>
+                <a:cs typeface="Calibri"/>
+              </a:rPr>
+              <a:t>, Huawei (liyizhou@Huawei.com)</a:t>
+            </a:r>
+            <a:r>
+              <a:rPr sz="2000"/>
+              <a:t>, </a:t>
+            </a:r>
+            <a:r>
+              <a:rPr lang="en-US" sz="2000" b="0" i="0" u="none" strike="noStrike" cap="none" spc="0">
+                <a:solidFill>
+                  <a:schemeClr val="tx1"/>
+                </a:solidFill>
+                <a:latin typeface="Arial"/>
+                <a:cs typeface="Arial"/>
+              </a:rPr>
+              <a:t>Xuesong Geng  (gengxuesong@huawei.com)</a:t>
+            </a:r>
+            <a:endParaRPr sz="1800" b="0" strike="noStrike" spc="0">
+              <a:solidFill>
+                <a:srgbClr val="000000"/>
+              </a:solidFill>
+              <a:latin typeface="Calibri"/>
             </a:endParaRPr>
           </a:p>
           <a:p>
@@ -3544,7 +3604,7 @@
                 </a:solidFill>
                 <a:latin typeface="Calibri"/>
               </a:rPr>
-              <a:t>IETF DETNET Interim, 09/2023 rev 1.0    9/11/2023</a:t>
+              <a:t>IETF DETNET Interim, 09/2023 rev 1.1    9/11/2023</a:t>
             </a:r>
             <a:endParaRPr lang="en-US" sz="2400" b="0" strike="noStrike" spc="0">
               <a:latin typeface="Arial"/>
@@ -5736,14 +5796,28 @@
                         <a:defRPr/>
                       </a:pPr>
                       <a:r>
-                        <a:rPr lang="en-US" sz="1200" b="1"/>
+                        <a:rPr lang="en-US" sz="1200" b="1" i="0" u="none" strike="noStrike" cap="none" spc="0">
+                          <a:solidFill>
+                            <a:schemeClr val="tx1"/>
+                          </a:solidFill>
+                          <a:latin typeface="+mn-lt"/>
+                          <a:ea typeface="+mn-ea"/>
+                          <a:cs typeface="+mn-cs"/>
+                        </a:rPr>
                         <a:t>Benefit over ECQF , CQF, TAS</a:t>
                       </a:r>
                       <a:r>
-                        <a:rPr lang="en-US" sz="1200"/>
-                        <a:t> (radio, retransmissions, length deviation)</a:t>
-                      </a:r>
-                      <a:endParaRPr lang="en-US" sz="1200"/>
+                        <a:rPr lang="en-US" sz="1200" b="0" i="0" u="none" strike="noStrike" cap="none" spc="0">
+                          <a:solidFill>
+                            <a:schemeClr val="tx1"/>
+                          </a:solidFill>
+                          <a:latin typeface="+mn-lt"/>
+                          <a:ea typeface="+mn-ea"/>
+                          <a:cs typeface="+mn-cs"/>
+                        </a:rPr>
+                        <a:t> (processing, RAW/retrans,length deviation)</a:t>
+                      </a:r>
+                      <a:endParaRPr sz="1200"/>
                     </a:p>
                   </a:txBody>
                   <a:tcPr>
@@ -8253,7 +8327,7 @@
             </a:pPr>
             <a:r>
               <a:rPr/>
-              <a:t>3.4 explanations</a:t>
+              <a:t>3.4 explanations / justifications</a:t>
             </a:r>
             <a:endParaRPr/>
           </a:p>
@@ -8277,7 +8351,7 @@
         </p:spPr>
         <p:txBody>
           <a:bodyPr vertOverflow="overflow" horzOverflow="overflow" vert="horz" wrap="square" lIns="91440" tIns="45720" rIns="91440" bIns="45720" numCol="1" spcCol="0" rtlCol="0" fromWordArt="0" anchor="t" anchorCtr="0" forceAA="0" upright="0" compatLnSpc="0">
-            <a:normAutofit fontScale="90000" lnSpcReduction="2000"/>
+            <a:normAutofit fontScale="85000" lnSpcReduction="3000"/>
           </a:bodyPr>
           <a:lstStyle/>
           <a:p>
@@ -8349,38 +8423,87 @@
             <a:endParaRPr/>
           </a:p>
           <a:p>
-            <a:pPr>
+            <a:pPr lvl="1">
               <a:defRPr/>
             </a:pPr>
             <a:r>
               <a:rPr/>
               <a:t>Reduced accuracy of clock synchronization / cycle timing vs. CQF / ECQF</a:t>
             </a:r>
-            <a:endParaRPr/>
+            <a:r>
+              <a:rPr lang="en-US" sz="2400" b="0" i="0" u="none" strike="noStrike" cap="none" spc="0">
+                <a:solidFill>
+                  <a:schemeClr val="tx1"/>
+                </a:solidFill>
+                <a:latin typeface="+mn-lt"/>
+                <a:ea typeface="+mn-ea"/>
+                <a:cs typeface="+mn-cs"/>
+              </a:rPr>
+              <a:t>Low per-packet clock accuracy across complex, large router</a:t>
+            </a:r>
+            <a:endParaRPr sz="2400"/>
           </a:p>
           <a:p>
             <a:pPr lvl="1">
               <a:defRPr/>
             </a:pPr>
             <a:r>
-              <a:rPr/>
-              <a:t>Low per-packet clock accuracy across complex, large router</a:t>
+              <a:rPr lang="en-US" sz="2400" b="0" i="0" u="none" strike="noStrike" cap="none" spc="0">
+                <a:solidFill>
+                  <a:schemeClr val="tx1"/>
+                </a:solidFill>
+                <a:latin typeface="+mn-lt"/>
+                <a:ea typeface="+mn-ea"/>
+                <a:cs typeface="+mn-cs"/>
+              </a:rPr>
+              <a:t>Because cycle number is in packet header, sender to receiver can have clock jitter / </a:t>
             </a:r>
-            <a:endParaRPr/>
+            <a:r>
+              <a:rPr lang="en-US" sz="2400" b="0" i="0" u="none" strike="noStrike" cap="none" spc="0">
+                <a:solidFill>
+                  <a:schemeClr val="tx1"/>
+                </a:solidFill>
+                <a:latin typeface="+mn-lt"/>
+                <a:ea typeface="+mn-ea"/>
+                <a:cs typeface="+mn-cs"/>
+              </a:rPr>
+              <a:t>wander.</a:t>
+            </a:r>
+            <a:endParaRPr sz="2400"/>
           </a:p>
           <a:p>
             <a:pPr lvl="1">
               <a:defRPr/>
             </a:pPr>
             <a:r>
-              <a:rPr/>
-              <a:t>Because cycle number is in packet header, sender to receiver can </a:t>
+              <a:rPr lang="en-US" sz="2400" b="0" i="0" u="none" strike="noStrike" cap="none" spc="0">
+                <a:solidFill>
+                  <a:schemeClr val="tx1"/>
+                </a:solidFill>
+                <a:latin typeface="+mn-lt"/>
+                <a:ea typeface="+mn-ea"/>
+                <a:cs typeface="+mn-cs"/>
+              </a:rPr>
+              <a:t>Tolerate per-hop propagation jitter as well </a:t>
             </a:r>
+            <a:endParaRPr sz="2400"/>
+          </a:p>
+          <a:p>
+            <a:pPr lvl="1">
+              <a:defRPr/>
+            </a:pPr>
             <a:r>
-              <a:rPr/>
-              <a:t>have clock jitter / wander.</a:t>
+              <a:rPr lang="en-US" sz="2400" b="0" i="0" u="none" strike="noStrike" cap="none" spc="0">
+                <a:solidFill>
+                  <a:schemeClr val="tx1"/>
+                </a:solidFill>
+                <a:latin typeface="+mn-lt"/>
+                <a:ea typeface="+mn-ea"/>
+                <a:cs typeface="+mn-cs"/>
+              </a:rPr>
+              <a:t>(explanations on 3.1 &amp; 3.2 as well)</a:t>
             </a:r>
-            <a:endParaRPr/>
+            <a:endParaRPr sz="2400"/>
           </a:p>
         </p:txBody>
       </p:sp>
@@ -17488,14 +17611,38 @@
               <a:defRPr/>
             </a:pPr>
             <a:r>
-              <a:rPr sz="2000"/>
-              <a:t>Because of: RAW (reflections, interference, retransmission), length deviation</a:t>
+              <a:rPr sz="2200"/>
+              <a:t>Node processing jitter at &gt;= 100 Gbps speeds – large complex router architectures</a:t>
+            </a:r>
+            <a:endParaRPr sz="2200"/>
+          </a:p>
+          <a:p>
+            <a:pPr lvl="1">
+              <a:defRPr/>
+            </a:pPr>
+            <a:r>
+              <a:rPr lang="en-US" sz="2200" b="0" i="0" u="none" strike="noStrike" cap="none" spc="0">
+                <a:solidFill>
+                  <a:schemeClr val="tx1"/>
+                </a:solidFill>
+                <a:latin typeface="+mn-lt"/>
+                <a:ea typeface="+mn-ea"/>
+                <a:cs typeface="+mn-cs"/>
+              </a:rPr>
+              <a:t>RAW (reflections, interference, retransmission), length deviation</a:t>
             </a:r>
             <a:r>
-              <a:rPr sz="2400"/>
+              <a:rPr lang="en-US" sz="2200" b="0" i="0" u="none" strike="noStrike" cap="none" spc="0">
+                <a:solidFill>
+                  <a:schemeClr val="tx1"/>
+                </a:solidFill>
+                <a:latin typeface="+mn-lt"/>
+                <a:ea typeface="+mn-ea"/>
+                <a:cs typeface="+mn-cs"/>
+              </a:rPr>
               <a:t> (wired)</a:t>
             </a:r>
-            <a:endParaRPr sz="2400"/>
+            <a:endParaRPr sz="2200"/>
           </a:p>
           <a:p>
             <a:pPr lvl="0">
@@ -17628,7 +17775,7 @@
                 <a:gridCol w="1170000"/>
                 <a:gridCol w="6480000"/>
                 <a:gridCol w="4015824"/>
-                <a:gridCol w="1473831"/>
+                <a:gridCol w="1473830"/>
                 <a:gridCol w="6407784"/>
               </a:tblGrid>
               <a:tr h="365760">
@@ -21017,7 +21164,7 @@
         <p:spPr bwMode="auto">
           <a:xfrm flipH="0" flipV="0">
             <a:off x="838197" y="365123"/>
-            <a:ext cx="10515600" cy="516175"/>
+            <a:ext cx="10515600" cy="516174"/>
           </a:xfrm>
         </p:spPr>
         <p:txBody>
@@ -23510,7 +23657,7 @@
                       </a:r>
                       <a:r>
                         <a:rPr lang="en-US" sz="1400"/>
-                        <a:t> (radio, retransmissions, length deviation)</a:t>
+                        <a:t> (processing, RAW/retrans,length deviation)</a:t>
                       </a:r>
                       <a:endParaRPr lang="en-US" sz="1400"/>
                     </a:p>
@@ -24357,6 +24504,7 @@
                       <a:solidFill>
                         <a:schemeClr val="tx1"/>
                       </a:solidFill>
+                      <a:bevel/>
                     </a:lnB>
                   </a:tcPr>
                 </a:tc>
@@ -25120,6 +25268,7 @@
                       <a:solidFill>
                         <a:schemeClr val="tx1"/>
                       </a:solidFill>
+                      <a:bevel/>
                     </a:lnB>
                   </a:tcPr>
                 </a:tc>

</xml_diff>